<commit_message>
Title and aesthetic improvements added to scatter plot
</commit_message>
<xml_diff>
--- a/Montage.pptx
+++ b/Montage.pptx
@@ -6,6 +6,7 @@
   </p:sldMasterIdLst>
   <p:sldIdLst>
     <p:sldId id="256" r:id="rId2"/>
+    <p:sldId id="257" r:id="rId3"/>
   </p:sldIdLst>
   <p:sldSz cx="12192000" cy="6858000"/>
   <p:notesSz cx="6858000" cy="9144000"/>
@@ -329,7 +330,7 @@
           <a:p>
             <a:fld id="{C4259C42-A359-EF45-BE3C-1DFDE182F8F4}" type="datetimeFigureOut">
               <a:rPr lang="en-US" smtClean="0"/>
-              <a:t>6/16/24</a:t>
+              <a:t>7/14/24</a:t>
             </a:fld>
             <a:endParaRPr lang="en-US"/>
           </a:p>
@@ -664,7 +665,7 @@
           <a:p>
             <a:fld id="{C4259C42-A359-EF45-BE3C-1DFDE182F8F4}" type="datetimeFigureOut">
               <a:rPr lang="en-US" smtClean="0"/>
-              <a:t>6/16/24</a:t>
+              <a:t>7/14/24</a:t>
             </a:fld>
             <a:endParaRPr lang="en-US"/>
           </a:p>
@@ -967,7 +968,7 @@
           <a:p>
             <a:fld id="{C4259C42-A359-EF45-BE3C-1DFDE182F8F4}" type="datetimeFigureOut">
               <a:rPr lang="en-US" smtClean="0"/>
-              <a:t>6/16/24</a:t>
+              <a:t>7/14/24</a:t>
             </a:fld>
             <a:endParaRPr lang="en-US"/>
           </a:p>
@@ -1215,7 +1216,7 @@
           <a:p>
             <a:fld id="{C4259C42-A359-EF45-BE3C-1DFDE182F8F4}" type="datetimeFigureOut">
               <a:rPr lang="en-US" smtClean="0"/>
-              <a:t>6/16/24</a:t>
+              <a:t>7/14/24</a:t>
             </a:fld>
             <a:endParaRPr lang="en-US"/>
           </a:p>
@@ -1623,7 +1624,7 @@
           <a:p>
             <a:fld id="{C4259C42-A359-EF45-BE3C-1DFDE182F8F4}" type="datetimeFigureOut">
               <a:rPr lang="en-US" smtClean="0"/>
-              <a:t>6/16/24</a:t>
+              <a:t>7/14/24</a:t>
             </a:fld>
             <a:endParaRPr lang="en-US"/>
           </a:p>
@@ -1938,7 +1939,7 @@
           <a:p>
             <a:fld id="{C4259C42-A359-EF45-BE3C-1DFDE182F8F4}" type="datetimeFigureOut">
               <a:rPr lang="en-US" smtClean="0"/>
-              <a:t>6/16/24</a:t>
+              <a:t>7/14/24</a:t>
             </a:fld>
             <a:endParaRPr lang="en-US"/>
           </a:p>
@@ -2483,7 +2484,7 @@
           <a:p>
             <a:fld id="{C4259C42-A359-EF45-BE3C-1DFDE182F8F4}" type="datetimeFigureOut">
               <a:rPr lang="en-US" smtClean="0"/>
-              <a:t>6/16/24</a:t>
+              <a:t>7/14/24</a:t>
             </a:fld>
             <a:endParaRPr lang="en-US"/>
           </a:p>
@@ -2679,7 +2680,7 @@
           <a:p>
             <a:fld id="{C4259C42-A359-EF45-BE3C-1DFDE182F8F4}" type="datetimeFigureOut">
               <a:rPr lang="en-US" smtClean="0"/>
-              <a:t>6/16/24</a:t>
+              <a:t>7/14/24</a:t>
             </a:fld>
             <a:endParaRPr lang="en-US"/>
           </a:p>
@@ -2893,7 +2894,7 @@
           <a:p>
             <a:fld id="{C4259C42-A359-EF45-BE3C-1DFDE182F8F4}" type="datetimeFigureOut">
               <a:rPr lang="en-US" smtClean="0"/>
-              <a:t>6/16/24</a:t>
+              <a:t>7/14/24</a:t>
             </a:fld>
             <a:endParaRPr lang="en-US"/>
           </a:p>
@@ -3263,7 +3264,7 @@
           <a:p>
             <a:fld id="{C4259C42-A359-EF45-BE3C-1DFDE182F8F4}" type="datetimeFigureOut">
               <a:rPr lang="en-US" smtClean="0"/>
-              <a:t>6/16/24</a:t>
+              <a:t>7/14/24</a:t>
             </a:fld>
             <a:endParaRPr lang="en-US"/>
           </a:p>
@@ -3667,7 +3668,7 @@
           <a:p>
             <a:fld id="{C4259C42-A359-EF45-BE3C-1DFDE182F8F4}" type="datetimeFigureOut">
               <a:rPr lang="en-US" smtClean="0"/>
-              <a:t>6/16/24</a:t>
+              <a:t>7/14/24</a:t>
             </a:fld>
             <a:endParaRPr lang="en-US"/>
           </a:p>
@@ -3979,7 +3980,7 @@
           <a:p>
             <a:fld id="{C4259C42-A359-EF45-BE3C-1DFDE182F8F4}" type="datetimeFigureOut">
               <a:rPr lang="en-US" smtClean="0"/>
-              <a:t>6/16/24</a:t>
+              <a:t>7/14/24</a:t>
             </a:fld>
             <a:endParaRPr lang="en-US"/>
           </a:p>
@@ -4857,6 +4858,280 @@
 </p:sld>
 </file>
 
+<file path=ppt/slides/slide2.xml><?xml version="1.0" encoding="utf-8"?>
+<p:sld xmlns:a="http://schemas.openxmlformats.org/drawingml/2006/main" xmlns:r="http://schemas.openxmlformats.org/officeDocument/2006/relationships" xmlns:p="http://schemas.openxmlformats.org/presentationml/2006/main">
+  <p:cSld>
+    <p:bg>
+      <p:bgPr>
+        <a:solidFill>
+          <a:schemeClr val="bg1"/>
+        </a:solidFill>
+        <a:effectLst/>
+      </p:bgPr>
+    </p:bg>
+    <p:spTree>
+      <p:nvGrpSpPr>
+        <p:cNvPr id="1" name=""/>
+        <p:cNvGrpSpPr/>
+        <p:nvPr/>
+      </p:nvGrpSpPr>
+      <p:grpSpPr>
+        <a:xfrm>
+          <a:off x="0" y="0"/>
+          <a:ext cx="0" cy="0"/>
+          <a:chOff x="0" y="0"/>
+          <a:chExt cx="0" cy="0"/>
+        </a:xfrm>
+      </p:grpSpPr>
+      <p:pic>
+        <p:nvPicPr>
+          <p:cNvPr id="9" name="Picture 8" descr="A screenshot of a graph&#10;&#10;Description automatically generated">
+            <a:extLst>
+              <a:ext uri="{FF2B5EF4-FFF2-40B4-BE49-F238E27FC236}">
+                <a16:creationId xmlns:a16="http://schemas.microsoft.com/office/drawing/2014/main" id="{20BCB96F-D177-73CA-D779-CE8C5F83B6E5}"/>
+              </a:ext>
+            </a:extLst>
+          </p:cNvPr>
+          <p:cNvPicPr>
+            <a:picLocks noChangeAspect="1"/>
+          </p:cNvPicPr>
+          <p:nvPr/>
+        </p:nvPicPr>
+        <p:blipFill rotWithShape="1">
+          <a:blip r:embed="rId2"/>
+          <a:srcRect t="33385" r="-2" b="5814"/>
+          <a:stretch/>
+        </p:blipFill>
+        <p:spPr>
+          <a:xfrm>
+            <a:off x="4493436" y="243"/>
+            <a:ext cx="7698564" cy="3346705"/>
+          </a:xfrm>
+          <a:custGeom>
+            <a:avLst/>
+            <a:gdLst/>
+            <a:ahLst/>
+            <a:cxnLst/>
+            <a:rect l="l" t="t" r="r" b="b"/>
+            <a:pathLst>
+              <a:path w="7698564" h="3346705">
+                <a:moveTo>
+                  <a:pt x="1549963" y="0"/>
+                </a:moveTo>
+                <a:lnTo>
+                  <a:pt x="1555540" y="0"/>
+                </a:lnTo>
+                <a:lnTo>
+                  <a:pt x="2621768" y="0"/>
+                </a:lnTo>
+                <a:lnTo>
+                  <a:pt x="6451640" y="0"/>
+                </a:lnTo>
+                <a:lnTo>
+                  <a:pt x="6451640" y="479"/>
+                </a:lnTo>
+                <a:lnTo>
+                  <a:pt x="7698564" y="479"/>
+                </a:lnTo>
+                <a:lnTo>
+                  <a:pt x="7698564" y="3346705"/>
+                </a:lnTo>
+                <a:lnTo>
+                  <a:pt x="0" y="3346705"/>
+                </a:lnTo>
+                <a:close/>
+              </a:path>
+            </a:pathLst>
+          </a:custGeom>
+        </p:spPr>
+      </p:pic>
+      <p:pic>
+        <p:nvPicPr>
+          <p:cNvPr id="7" name="Picture 6" descr="A chart with different colored squares&#10;&#10;Description automatically generated">
+            <a:extLst>
+              <a:ext uri="{FF2B5EF4-FFF2-40B4-BE49-F238E27FC236}">
+                <a16:creationId xmlns:a16="http://schemas.microsoft.com/office/drawing/2014/main" id="{B96776BB-88BB-5595-4CF6-BED0638A1EAB}"/>
+              </a:ext>
+            </a:extLst>
+          </p:cNvPr>
+          <p:cNvPicPr>
+            <a:picLocks noChangeAspect="1"/>
+          </p:cNvPicPr>
+          <p:nvPr/>
+        </p:nvPicPr>
+        <p:blipFill rotWithShape="1">
+          <a:blip r:embed="rId3"/>
+          <a:srcRect t="20122" r="-3" b="-3"/>
+          <a:stretch/>
+        </p:blipFill>
+        <p:spPr>
+          <a:xfrm>
+            <a:off x="20" y="10"/>
+            <a:ext cx="5859777" cy="3346695"/>
+          </a:xfrm>
+          <a:custGeom>
+            <a:avLst/>
+            <a:gdLst/>
+            <a:ahLst/>
+            <a:cxnLst/>
+            <a:rect l="l" t="t" r="r" b="b"/>
+            <a:pathLst>
+              <a:path w="5859797" h="3346705">
+                <a:moveTo>
+                  <a:pt x="0" y="0"/>
+                </a:moveTo>
+                <a:lnTo>
+                  <a:pt x="5859797" y="0"/>
+                </a:lnTo>
+                <a:lnTo>
+                  <a:pt x="4309834" y="3346705"/>
+                </a:lnTo>
+                <a:lnTo>
+                  <a:pt x="4304257" y="3346705"/>
+                </a:lnTo>
+                <a:lnTo>
+                  <a:pt x="3238029" y="3346705"/>
+                </a:lnTo>
+                <a:lnTo>
+                  <a:pt x="0" y="3346705"/>
+                </a:lnTo>
+                <a:close/>
+              </a:path>
+            </a:pathLst>
+          </a:custGeom>
+        </p:spPr>
+      </p:pic>
+      <p:pic>
+        <p:nvPicPr>
+          <p:cNvPr id="11" name="Picture 10" descr="A graph of different colored lines&#10;&#10;Description automatically generated">
+            <a:extLst>
+              <a:ext uri="{FF2B5EF4-FFF2-40B4-BE49-F238E27FC236}">
+                <a16:creationId xmlns:a16="http://schemas.microsoft.com/office/drawing/2014/main" id="{7EBA0EA3-B7C7-193D-105F-95DB2E30474D}"/>
+              </a:ext>
+            </a:extLst>
+          </p:cNvPr>
+          <p:cNvPicPr>
+            <a:picLocks noChangeAspect="1"/>
+          </p:cNvPicPr>
+          <p:nvPr/>
+        </p:nvPicPr>
+        <p:blipFill rotWithShape="1">
+          <a:blip r:embed="rId4"/>
+          <a:srcRect t="10786" r="2" b="9093"/>
+          <a:stretch/>
+        </p:blipFill>
+        <p:spPr>
+          <a:xfrm>
+            <a:off x="6350089" y="3511295"/>
+            <a:ext cx="5841911" cy="3346705"/>
+          </a:xfrm>
+          <a:custGeom>
+            <a:avLst/>
+            <a:gdLst/>
+            <a:ahLst/>
+            <a:cxnLst/>
+            <a:rect l="l" t="t" r="r" b="b"/>
+            <a:pathLst>
+              <a:path w="5841911" h="3346705">
+                <a:moveTo>
+                  <a:pt x="1549963" y="0"/>
+                </a:moveTo>
+                <a:lnTo>
+                  <a:pt x="1555540" y="0"/>
+                </a:lnTo>
+                <a:lnTo>
+                  <a:pt x="2621768" y="0"/>
+                </a:lnTo>
+                <a:lnTo>
+                  <a:pt x="5841911" y="0"/>
+                </a:lnTo>
+                <a:lnTo>
+                  <a:pt x="5841911" y="3346705"/>
+                </a:lnTo>
+                <a:lnTo>
+                  <a:pt x="0" y="3346705"/>
+                </a:lnTo>
+                <a:close/>
+              </a:path>
+            </a:pathLst>
+          </a:custGeom>
+        </p:spPr>
+      </p:pic>
+      <p:pic>
+        <p:nvPicPr>
+          <p:cNvPr id="5" name="Content Placeholder 4" descr="A graph of different colors&#10;&#10;Description automatically generated">
+            <a:extLst>
+              <a:ext uri="{FF2B5EF4-FFF2-40B4-BE49-F238E27FC236}">
+                <a16:creationId xmlns:a16="http://schemas.microsoft.com/office/drawing/2014/main" id="{16CB8818-696F-4197-4A67-9D2B0C0892A9}"/>
+              </a:ext>
+            </a:extLst>
+          </p:cNvPr>
+          <p:cNvPicPr>
+            <a:picLocks noChangeAspect="1"/>
+          </p:cNvPicPr>
+          <p:nvPr/>
+        </p:nvPicPr>
+        <p:blipFill rotWithShape="1">
+          <a:blip r:embed="rId5"/>
+          <a:srcRect t="15897" r="-2" b="13702"/>
+          <a:stretch/>
+        </p:blipFill>
+        <p:spPr>
+          <a:xfrm>
+            <a:off x="20" y="3511295"/>
+            <a:ext cx="7698544" cy="3346705"/>
+          </a:xfrm>
+          <a:custGeom>
+            <a:avLst/>
+            <a:gdLst/>
+            <a:ahLst/>
+            <a:cxnLst/>
+            <a:rect l="l" t="t" r="r" b="b"/>
+            <a:pathLst>
+              <a:path w="7698564" h="3346705">
+                <a:moveTo>
+                  <a:pt x="0" y="0"/>
+                </a:moveTo>
+                <a:lnTo>
+                  <a:pt x="7698564" y="0"/>
+                </a:lnTo>
+                <a:lnTo>
+                  <a:pt x="6148601" y="3346705"/>
+                </a:lnTo>
+                <a:lnTo>
+                  <a:pt x="6143024" y="3346705"/>
+                </a:lnTo>
+                <a:lnTo>
+                  <a:pt x="5076796" y="3346705"/>
+                </a:lnTo>
+                <a:lnTo>
+                  <a:pt x="1246924" y="3346705"/>
+                </a:lnTo>
+                <a:lnTo>
+                  <a:pt x="1246924" y="3346226"/>
+                </a:lnTo>
+                <a:lnTo>
+                  <a:pt x="0" y="3346226"/>
+                </a:lnTo>
+                <a:close/>
+              </a:path>
+            </a:pathLst>
+          </a:custGeom>
+        </p:spPr>
+      </p:pic>
+    </p:spTree>
+    <p:extLst>
+      <p:ext uri="{BB962C8B-B14F-4D97-AF65-F5344CB8AC3E}">
+        <p14:creationId xmlns:p14="http://schemas.microsoft.com/office/powerpoint/2010/main" val="3071543471"/>
+      </p:ext>
+    </p:extLst>
+  </p:cSld>
+  <p:clrMapOvr>
+    <a:masterClrMapping/>
+  </p:clrMapOvr>
+</p:sld>
+</file>
+
 <file path=ppt/theme/theme1.xml><?xml version="1.0" encoding="utf-8"?>
 <a:theme xmlns:a="http://schemas.openxmlformats.org/drawingml/2006/main" name="Madison">
   <a:themeElements>

</xml_diff>

<commit_message>
Tidytuesday viz finalised for the week submission
</commit_message>
<xml_diff>
--- a/Montage.pptx
+++ b/Montage.pptx
@@ -330,7 +330,7 @@
           <a:p>
             <a:fld id="{C4259C42-A359-EF45-BE3C-1DFDE182F8F4}" type="datetimeFigureOut">
               <a:rPr lang="en-US" smtClean="0"/>
-              <a:t>7/14/24</a:t>
+              <a:t>7/18/24</a:t>
             </a:fld>
             <a:endParaRPr lang="en-US"/>
           </a:p>
@@ -665,7 +665,7 @@
           <a:p>
             <a:fld id="{C4259C42-A359-EF45-BE3C-1DFDE182F8F4}" type="datetimeFigureOut">
               <a:rPr lang="en-US" smtClean="0"/>
-              <a:t>7/14/24</a:t>
+              <a:t>7/18/24</a:t>
             </a:fld>
             <a:endParaRPr lang="en-US"/>
           </a:p>
@@ -968,7 +968,7 @@
           <a:p>
             <a:fld id="{C4259C42-A359-EF45-BE3C-1DFDE182F8F4}" type="datetimeFigureOut">
               <a:rPr lang="en-US" smtClean="0"/>
-              <a:t>7/14/24</a:t>
+              <a:t>7/18/24</a:t>
             </a:fld>
             <a:endParaRPr lang="en-US"/>
           </a:p>
@@ -1216,7 +1216,7 @@
           <a:p>
             <a:fld id="{C4259C42-A359-EF45-BE3C-1DFDE182F8F4}" type="datetimeFigureOut">
               <a:rPr lang="en-US" smtClean="0"/>
-              <a:t>7/14/24</a:t>
+              <a:t>7/18/24</a:t>
             </a:fld>
             <a:endParaRPr lang="en-US"/>
           </a:p>
@@ -1624,7 +1624,7 @@
           <a:p>
             <a:fld id="{C4259C42-A359-EF45-BE3C-1DFDE182F8F4}" type="datetimeFigureOut">
               <a:rPr lang="en-US" smtClean="0"/>
-              <a:t>7/14/24</a:t>
+              <a:t>7/18/24</a:t>
             </a:fld>
             <a:endParaRPr lang="en-US"/>
           </a:p>
@@ -1939,7 +1939,7 @@
           <a:p>
             <a:fld id="{C4259C42-A359-EF45-BE3C-1DFDE182F8F4}" type="datetimeFigureOut">
               <a:rPr lang="en-US" smtClean="0"/>
-              <a:t>7/14/24</a:t>
+              <a:t>7/18/24</a:t>
             </a:fld>
             <a:endParaRPr lang="en-US"/>
           </a:p>
@@ -2484,7 +2484,7 @@
           <a:p>
             <a:fld id="{C4259C42-A359-EF45-BE3C-1DFDE182F8F4}" type="datetimeFigureOut">
               <a:rPr lang="en-US" smtClean="0"/>
-              <a:t>7/14/24</a:t>
+              <a:t>7/18/24</a:t>
             </a:fld>
             <a:endParaRPr lang="en-US"/>
           </a:p>
@@ -2680,7 +2680,7 @@
           <a:p>
             <a:fld id="{C4259C42-A359-EF45-BE3C-1DFDE182F8F4}" type="datetimeFigureOut">
               <a:rPr lang="en-US" smtClean="0"/>
-              <a:t>7/14/24</a:t>
+              <a:t>7/18/24</a:t>
             </a:fld>
             <a:endParaRPr lang="en-US"/>
           </a:p>
@@ -2894,7 +2894,7 @@
           <a:p>
             <a:fld id="{C4259C42-A359-EF45-BE3C-1DFDE182F8F4}" type="datetimeFigureOut">
               <a:rPr lang="en-US" smtClean="0"/>
-              <a:t>7/14/24</a:t>
+              <a:t>7/18/24</a:t>
             </a:fld>
             <a:endParaRPr lang="en-US"/>
           </a:p>
@@ -3264,7 +3264,7 @@
           <a:p>
             <a:fld id="{C4259C42-A359-EF45-BE3C-1DFDE182F8F4}" type="datetimeFigureOut">
               <a:rPr lang="en-US" smtClean="0"/>
-              <a:t>7/14/24</a:t>
+              <a:t>7/18/24</a:t>
             </a:fld>
             <a:endParaRPr lang="en-US"/>
           </a:p>
@@ -3668,7 +3668,7 @@
           <a:p>
             <a:fld id="{C4259C42-A359-EF45-BE3C-1DFDE182F8F4}" type="datetimeFigureOut">
               <a:rPr lang="en-US" smtClean="0"/>
-              <a:t>7/14/24</a:t>
+              <a:t>7/18/24</a:t>
             </a:fld>
             <a:endParaRPr lang="en-US"/>
           </a:p>
@@ -3980,7 +3980,7 @@
           <a:p>
             <a:fld id="{C4259C42-A359-EF45-BE3C-1DFDE182F8F4}" type="datetimeFigureOut">
               <a:rPr lang="en-US" smtClean="0"/>
-              <a:t>7/14/24</a:t>
+              <a:t>7/18/24</a:t>
             </a:fld>
             <a:endParaRPr lang="en-US"/>
           </a:p>
@@ -4885,10 +4885,10 @@
       </p:grpSpPr>
       <p:pic>
         <p:nvPicPr>
-          <p:cNvPr id="9" name="Picture 8" descr="A screenshot of a graph&#10;&#10;Description automatically generated">
+          <p:cNvPr id="11" name="Picture 10" descr="A graph of different colored lines&#10;&#10;Description automatically generated">
             <a:extLst>
               <a:ext uri="{FF2B5EF4-FFF2-40B4-BE49-F238E27FC236}">
-                <a16:creationId xmlns:a16="http://schemas.microsoft.com/office/drawing/2014/main" id="{20BCB96F-D177-73CA-D779-CE8C5F83B6E5}"/>
+                <a16:creationId xmlns:a16="http://schemas.microsoft.com/office/drawing/2014/main" id="{7EBA0EA3-B7C7-193D-105F-95DB2E30474D}"/>
               </a:ext>
             </a:extLst>
           </p:cNvPr>
@@ -4899,12 +4899,68 @@
         </p:nvPicPr>
         <p:blipFill rotWithShape="1">
           <a:blip r:embed="rId2"/>
-          <a:srcRect t="33385" r="-2" b="5814"/>
+          <a:srcRect l="634" r="9111" b="2"/>
           <a:stretch/>
         </p:blipFill>
         <p:spPr>
           <a:xfrm>
-            <a:off x="4493436" y="243"/>
+            <a:off x="7967351" y="-1"/>
+            <a:ext cx="4224651" cy="3346705"/>
+          </a:xfrm>
+          <a:custGeom>
+            <a:avLst/>
+            <a:gdLst/>
+            <a:ahLst/>
+            <a:cxnLst/>
+            <a:rect l="l" t="t" r="r" b="b"/>
+            <a:pathLst>
+              <a:path w="4224651" h="3346705">
+                <a:moveTo>
+                  <a:pt x="1549963" y="0"/>
+                </a:moveTo>
+                <a:lnTo>
+                  <a:pt x="1555540" y="0"/>
+                </a:lnTo>
+                <a:lnTo>
+                  <a:pt x="2621768" y="0"/>
+                </a:lnTo>
+                <a:lnTo>
+                  <a:pt x="4224651" y="0"/>
+                </a:lnTo>
+                <a:lnTo>
+                  <a:pt x="4224651" y="3346705"/>
+                </a:lnTo>
+                <a:lnTo>
+                  <a:pt x="0" y="3346705"/>
+                </a:lnTo>
+                <a:close/>
+              </a:path>
+            </a:pathLst>
+          </a:custGeom>
+        </p:spPr>
+      </p:pic>
+      <p:pic>
+        <p:nvPicPr>
+          <p:cNvPr id="5" name="Content Placeholder 4" descr="A graph of different colors&#10;&#10;Description automatically generated">
+            <a:extLst>
+              <a:ext uri="{FF2B5EF4-FFF2-40B4-BE49-F238E27FC236}">
+                <a16:creationId xmlns:a16="http://schemas.microsoft.com/office/drawing/2014/main" id="{16CB8818-696F-4197-4A67-9D2B0C0892A9}"/>
+              </a:ext>
+            </a:extLst>
+          </p:cNvPr>
+          <p:cNvPicPr>
+            <a:picLocks noChangeAspect="1"/>
+          </p:cNvPicPr>
+          <p:nvPr/>
+        </p:nvPicPr>
+        <p:blipFill rotWithShape="1">
+          <a:blip r:embed="rId3"/>
+          <a:srcRect t="15897" r="-2" b="13702"/>
+          <a:stretch/>
+        </p:blipFill>
+        <p:spPr>
+          <a:xfrm>
+            <a:off x="4493435" y="243"/>
             <a:ext cx="7698564" cy="3346705"/>
           </a:xfrm>
           <a:custGeom>
@@ -4925,13 +4981,13 @@
                   <a:pt x="2621768" y="0"/>
                 </a:lnTo>
                 <a:lnTo>
-                  <a:pt x="6451640" y="0"/>
+                  <a:pt x="4832507" y="0"/>
                 </a:lnTo>
                 <a:lnTo>
-                  <a:pt x="6451640" y="479"/>
+                  <a:pt x="3282657" y="3346461"/>
                 </a:lnTo>
                 <a:lnTo>
-                  <a:pt x="7698564" y="479"/>
+                  <a:pt x="7698564" y="3346461"/>
                 </a:lnTo>
                 <a:lnTo>
                   <a:pt x="7698564" y="3346705"/>
@@ -4947,10 +5003,10 @@
       </p:pic>
       <p:pic>
         <p:nvPicPr>
-          <p:cNvPr id="7" name="Picture 6" descr="A chart with different colored squares&#10;&#10;Description automatically generated">
+          <p:cNvPr id="9" name="Picture 8" descr="A screenshot of a graph&#10;&#10;Description automatically generated">
             <a:extLst>
               <a:ext uri="{FF2B5EF4-FFF2-40B4-BE49-F238E27FC236}">
-                <a16:creationId xmlns:a16="http://schemas.microsoft.com/office/drawing/2014/main" id="{B96776BB-88BB-5595-4CF6-BED0638A1EAB}"/>
+                <a16:creationId xmlns:a16="http://schemas.microsoft.com/office/drawing/2014/main" id="{20BCB96F-D177-73CA-D779-CE8C5F83B6E5}"/>
               </a:ext>
             </a:extLst>
           </p:cNvPr>
@@ -4960,7 +5016,7 @@
           <p:nvPr/>
         </p:nvPicPr>
         <p:blipFill rotWithShape="1">
-          <a:blip r:embed="rId3"/>
+          <a:blip r:embed="rId4"/>
           <a:srcRect t="20122" r="-3" b="-3"/>
           <a:stretch/>
         </p:blipFill>
@@ -5003,10 +5059,10 @@
       </p:pic>
       <p:pic>
         <p:nvPicPr>
-          <p:cNvPr id="11" name="Picture 10" descr="A graph of different colored lines&#10;&#10;Description automatically generated">
+          <p:cNvPr id="7" name="Picture 6" descr="A chart with different colored squares&#10;&#10;Description automatically generated">
             <a:extLst>
               <a:ext uri="{FF2B5EF4-FFF2-40B4-BE49-F238E27FC236}">
-                <a16:creationId xmlns:a16="http://schemas.microsoft.com/office/drawing/2014/main" id="{7EBA0EA3-B7C7-193D-105F-95DB2E30474D}"/>
+                <a16:creationId xmlns:a16="http://schemas.microsoft.com/office/drawing/2014/main" id="{B96776BB-88BB-5595-4CF6-BED0638A1EAB}"/>
               </a:ext>
             </a:extLst>
           </p:cNvPr>
@@ -5016,13 +5072,13 @@
           <p:nvPr/>
         </p:nvPicPr>
         <p:blipFill rotWithShape="1">
-          <a:blip r:embed="rId4"/>
-          <a:srcRect t="10786" r="2" b="9093"/>
+          <a:blip r:embed="rId5"/>
+          <a:srcRect t="19877" r="2" b="2"/>
           <a:stretch/>
         </p:blipFill>
         <p:spPr>
           <a:xfrm>
-            <a:off x="6350089" y="3511295"/>
+            <a:off x="6350090" y="3511295"/>
             <a:ext cx="5841911" cy="3346705"/>
           </a:xfrm>
           <a:custGeom>
@@ -5059,10 +5115,10 @@
       </p:pic>
       <p:pic>
         <p:nvPicPr>
-          <p:cNvPr id="5" name="Content Placeholder 4" descr="A graph of different colors&#10;&#10;Description automatically generated">
+          <p:cNvPr id="3" name="Picture 2" descr="A chart with red and yellow dots&#10;&#10;Description automatically generated">
             <a:extLst>
               <a:ext uri="{FF2B5EF4-FFF2-40B4-BE49-F238E27FC236}">
-                <a16:creationId xmlns:a16="http://schemas.microsoft.com/office/drawing/2014/main" id="{16CB8818-696F-4197-4A67-9D2B0C0892A9}"/>
+                <a16:creationId xmlns:a16="http://schemas.microsoft.com/office/drawing/2014/main" id="{A7836241-5229-164F-5DC6-587ED78738AC}"/>
               </a:ext>
             </a:extLst>
           </p:cNvPr>
@@ -5071,15 +5127,15 @@
           </p:cNvPicPr>
           <p:nvPr/>
         </p:nvPicPr>
-        <p:blipFill rotWithShape="1">
-          <a:blip r:embed="rId5"/>
-          <a:srcRect t="15897" r="-2" b="13702"/>
+        <p:blipFill>
+          <a:blip r:embed="rId6"/>
+          <a:srcRect t="4075" r="-2" b="23470"/>
           <a:stretch/>
         </p:blipFill>
         <p:spPr>
           <a:xfrm>
-            <a:off x="20" y="3511295"/>
-            <a:ext cx="7698544" cy="3346705"/>
+            <a:off x="-1" y="3511295"/>
+            <a:ext cx="7698564" cy="3346705"/>
           </a:xfrm>
           <a:custGeom>
             <a:avLst/>

</xml_diff>